<commit_message>
Last Push - Updated README
</commit_message>
<xml_diff>
--- a/Supporting Documents/Model_Comparison.pptx
+++ b/Supporting Documents/Model_Comparison.pptx
@@ -113,15 +113,38 @@
 </p:presentation>
 </file>
 
+<file path=ppt/revisionInfo.xml><?xml version="1.0" encoding="utf-8"?>
+<p1510:revInfo xmlns:a="http://schemas.openxmlformats.org/drawingml/2006/main" xmlns:r="http://schemas.openxmlformats.org/officeDocument/2006/relationships" xmlns:p1510="http://schemas.microsoft.com/office/powerpoint/2015/10/main">
+  <p1510:revLst>
+    <p1510:client id="{7F340B4D-3AAD-4E9B-BC09-769D36D87ED3}" v="6" dt="2021-08-26T12:34:16.763"/>
+  </p1510:revLst>
+</p1510:revInfo>
+</file>
+
 <file path=ppt/changesInfos/changesInfo1.xml><?xml version="1.0" encoding="utf-8"?>
 <pc:chgInfo xmlns:a="http://schemas.openxmlformats.org/drawingml/2006/main" xmlns:r="http://schemas.openxmlformats.org/officeDocument/2006/relationships" xmlns:ac="http://schemas.microsoft.com/office/drawing/2013/main/command" xmlns:pc="http://schemas.microsoft.com/office/powerpoint/2013/main/command">
   <pc:docChgLst>
     <pc:chgData name="Alysha Snowden" userId="6a790581ae0df517" providerId="LiveId" clId="{7F340B4D-3AAD-4E9B-BC09-769D36D87ED3}"/>
     <pc:docChg chg="custSel addSld modSld">
-      <pc:chgData name="Alysha Snowden" userId="6a790581ae0df517" providerId="LiveId" clId="{7F340B4D-3AAD-4E9B-BC09-769D36D87ED3}" dt="2021-08-25T07:58:24.296" v="27" actId="14100"/>
+      <pc:chgData name="Alysha Snowden" userId="6a790581ae0df517" providerId="LiveId" clId="{7F340B4D-3AAD-4E9B-BC09-769D36D87ED3}" dt="2021-08-26T12:34:46.669" v="28" actId="20577"/>
       <pc:docMkLst>
         <pc:docMk/>
       </pc:docMkLst>
+      <pc:sldChg chg="modSp mod">
+        <pc:chgData name="Alysha Snowden" userId="6a790581ae0df517" providerId="LiveId" clId="{7F340B4D-3AAD-4E9B-BC09-769D36D87ED3}" dt="2021-08-26T12:34:46.669" v="28" actId="20577"/>
+        <pc:sldMkLst>
+          <pc:docMk/>
+          <pc:sldMk cId="3962681683" sldId="259"/>
+        </pc:sldMkLst>
+        <pc:spChg chg="mod">
+          <ac:chgData name="Alysha Snowden" userId="6a790581ae0df517" providerId="LiveId" clId="{7F340B4D-3AAD-4E9B-BC09-769D36D87ED3}" dt="2021-08-26T12:34:46.669" v="28" actId="20577"/>
+          <ac:spMkLst>
+            <pc:docMk/>
+            <pc:sldMk cId="3962681683" sldId="259"/>
+            <ac:spMk id="22" creationId="{5EAB3787-B2E4-4AB4-93A7-9443353C9A08}"/>
+          </ac:spMkLst>
+        </pc:spChg>
+      </pc:sldChg>
       <pc:sldChg chg="addSp delSp modSp new mod">
         <pc:chgData name="Alysha Snowden" userId="6a790581ae0df517" providerId="LiveId" clId="{7F340B4D-3AAD-4E9B-BC09-769D36D87ED3}" dt="2021-08-25T07:58:24.296" v="27" actId="14100"/>
         <pc:sldMkLst>
@@ -331,7 +354,7 @@
           <a:p>
             <a:fld id="{A5F58B06-54D4-4ACA-9EB6-B1250836DB48}" type="datetimeFigureOut">
               <a:rPr lang="en-AU" smtClean="0"/>
-              <a:t>25/08/2021</a:t>
+              <a:t>26/08/2021</a:t>
             </a:fld>
             <a:endParaRPr lang="en-AU"/>
           </a:p>
@@ -531,7 +554,7 @@
           <a:p>
             <a:fld id="{A5F58B06-54D4-4ACA-9EB6-B1250836DB48}" type="datetimeFigureOut">
               <a:rPr lang="en-AU" smtClean="0"/>
-              <a:t>25/08/2021</a:t>
+              <a:t>26/08/2021</a:t>
             </a:fld>
             <a:endParaRPr lang="en-AU"/>
           </a:p>
@@ -741,7 +764,7 @@
           <a:p>
             <a:fld id="{A5F58B06-54D4-4ACA-9EB6-B1250836DB48}" type="datetimeFigureOut">
               <a:rPr lang="en-AU" smtClean="0"/>
-              <a:t>25/08/2021</a:t>
+              <a:t>26/08/2021</a:t>
             </a:fld>
             <a:endParaRPr lang="en-AU"/>
           </a:p>
@@ -941,7 +964,7 @@
           <a:p>
             <a:fld id="{A5F58B06-54D4-4ACA-9EB6-B1250836DB48}" type="datetimeFigureOut">
               <a:rPr lang="en-AU" smtClean="0"/>
-              <a:t>25/08/2021</a:t>
+              <a:t>26/08/2021</a:t>
             </a:fld>
             <a:endParaRPr lang="en-AU"/>
           </a:p>
@@ -1217,7 +1240,7 @@
           <a:p>
             <a:fld id="{A5F58B06-54D4-4ACA-9EB6-B1250836DB48}" type="datetimeFigureOut">
               <a:rPr lang="en-AU" smtClean="0"/>
-              <a:t>25/08/2021</a:t>
+              <a:t>26/08/2021</a:t>
             </a:fld>
             <a:endParaRPr lang="en-AU"/>
           </a:p>
@@ -1485,7 +1508,7 @@
           <a:p>
             <a:fld id="{A5F58B06-54D4-4ACA-9EB6-B1250836DB48}" type="datetimeFigureOut">
               <a:rPr lang="en-AU" smtClean="0"/>
-              <a:t>25/08/2021</a:t>
+              <a:t>26/08/2021</a:t>
             </a:fld>
             <a:endParaRPr lang="en-AU"/>
           </a:p>
@@ -1900,7 +1923,7 @@
           <a:p>
             <a:fld id="{A5F58B06-54D4-4ACA-9EB6-B1250836DB48}" type="datetimeFigureOut">
               <a:rPr lang="en-AU" smtClean="0"/>
-              <a:t>25/08/2021</a:t>
+              <a:t>26/08/2021</a:t>
             </a:fld>
             <a:endParaRPr lang="en-AU"/>
           </a:p>
@@ -2042,7 +2065,7 @@
           <a:p>
             <a:fld id="{A5F58B06-54D4-4ACA-9EB6-B1250836DB48}" type="datetimeFigureOut">
               <a:rPr lang="en-AU" smtClean="0"/>
-              <a:t>25/08/2021</a:t>
+              <a:t>26/08/2021</a:t>
             </a:fld>
             <a:endParaRPr lang="en-AU"/>
           </a:p>
@@ -2155,7 +2178,7 @@
           <a:p>
             <a:fld id="{A5F58B06-54D4-4ACA-9EB6-B1250836DB48}" type="datetimeFigureOut">
               <a:rPr lang="en-AU" smtClean="0"/>
-              <a:t>25/08/2021</a:t>
+              <a:t>26/08/2021</a:t>
             </a:fld>
             <a:endParaRPr lang="en-AU"/>
           </a:p>
@@ -2468,7 +2491,7 @@
           <a:p>
             <a:fld id="{A5F58B06-54D4-4ACA-9EB6-B1250836DB48}" type="datetimeFigureOut">
               <a:rPr lang="en-AU" smtClean="0"/>
-              <a:t>25/08/2021</a:t>
+              <a:t>26/08/2021</a:t>
             </a:fld>
             <a:endParaRPr lang="en-AU"/>
           </a:p>
@@ -2757,7 +2780,7 @@
           <a:p>
             <a:fld id="{A5F58B06-54D4-4ACA-9EB6-B1250836DB48}" type="datetimeFigureOut">
               <a:rPr lang="en-AU" smtClean="0"/>
-              <a:t>25/08/2021</a:t>
+              <a:t>26/08/2021</a:t>
             </a:fld>
             <a:endParaRPr lang="en-AU"/>
           </a:p>
@@ -3000,7 +3023,7 @@
           <a:p>
             <a:fld id="{A5F58B06-54D4-4ACA-9EB6-B1250836DB48}" type="datetimeFigureOut">
               <a:rPr lang="en-AU" smtClean="0"/>
-              <a:t>25/08/2021</a:t>
+              <a:t>26/08/2021</a:t>
             </a:fld>
             <a:endParaRPr lang="en-AU"/>
           </a:p>
@@ -3464,36 +3487,8 @@
           </a:p>
           <a:p>
             <a:r>
-              <a:rPr lang="en-AU" dirty="0" err="1"/>
-              <a:t>model_data</a:t>
-            </a:r>
-            <a:r>
               <a:rPr lang="en-AU" dirty="0"/>
-              <a:t>['</a:t>
-            </a:r>
-            <a:r>
-              <a:rPr lang="en-AU" dirty="0" err="1"/>
-              <a:t>average_revenue</a:t>
-            </a:r>
-            <a:r>
-              <a:rPr lang="en-AU" dirty="0"/>
-              <a:t>'] = </a:t>
-            </a:r>
-            <a:r>
-              <a:rPr lang="en-AU" dirty="0" err="1"/>
-              <a:t>np.where</a:t>
-            </a:r>
-            <a:r>
-              <a:rPr lang="en-AU" dirty="0"/>
-              <a:t>(</a:t>
-            </a:r>
-            <a:r>
-              <a:rPr lang="en-AU" dirty="0" err="1"/>
-              <a:t>model_data</a:t>
-            </a:r>
-            <a:r>
-              <a:rPr lang="en-AU" dirty="0"/>
-              <a:t>['revenue'] &gt;1700000, 1, 0)</a:t>
+              <a:t>model_data['average_revenue'] = np.where(model_data['revenue'] &gt;1700000, 1, 0)</a:t>
             </a:r>
           </a:p>
         </p:txBody>
@@ -3664,15 +3659,7 @@
           <a:p>
             <a:r>
               <a:rPr lang="en-AU" dirty="0"/>
-              <a:t>Y (</a:t>
-            </a:r>
-            <a:r>
-              <a:rPr lang="en-AU" dirty="0" err="1"/>
-              <a:t>TotalVotes</a:t>
-            </a:r>
-            <a:r>
-              <a:rPr lang="en-AU" dirty="0"/>
-              <a:t>)</a:t>
+              <a:t>Y (TotalVotes)</a:t>
             </a:r>
           </a:p>
         </p:txBody>
@@ -3794,44 +3781,8 @@
           </a:p>
           <a:p>
             <a:r>
-              <a:rPr lang="en-AU" dirty="0" err="1"/>
-              <a:t>model_data</a:t>
-            </a:r>
-            <a:r>
               <a:rPr lang="en-AU" dirty="0"/>
-              <a:t>['</a:t>
-            </a:r>
-            <a:r>
-              <a:rPr lang="en-AU" dirty="0" err="1"/>
-              <a:t>total_votes</a:t>
-            </a:r>
-            <a:r>
-              <a:rPr lang="en-AU" dirty="0"/>
-              <a:t>'] = </a:t>
-            </a:r>
-            <a:r>
-              <a:rPr lang="en-AU" dirty="0" err="1"/>
-              <a:t>np.where</a:t>
-            </a:r>
-            <a:r>
-              <a:rPr lang="en-AU" dirty="0"/>
-              <a:t>(</a:t>
-            </a:r>
-            <a:r>
-              <a:rPr lang="en-AU" dirty="0" err="1"/>
-              <a:t>model_data</a:t>
-            </a:r>
-            <a:r>
-              <a:rPr lang="en-AU" dirty="0"/>
-              <a:t>['</a:t>
-            </a:r>
-            <a:r>
-              <a:rPr lang="en-AU" dirty="0" err="1"/>
-              <a:t>totalVotes</a:t>
-            </a:r>
-            <a:r>
-              <a:rPr lang="en-AU" dirty="0"/>
-              <a:t>'] &gt;263, 1, 0)</a:t>
+              <a:t>model_data['total_votes'] = np.where(model_data['total Votes'] &gt;263, 1, 0)</a:t>
             </a:r>
           </a:p>
         </p:txBody>
@@ -3978,36 +3929,8 @@
           </a:p>
           <a:p>
             <a:r>
-              <a:rPr lang="en-AU" dirty="0" err="1"/>
-              <a:t>model_data</a:t>
-            </a:r>
-            <a:r>
               <a:rPr lang="en-AU" dirty="0"/>
-              <a:t>['</a:t>
-            </a:r>
-            <a:r>
-              <a:rPr lang="en-AU" dirty="0" err="1"/>
-              <a:t>popularity_rating</a:t>
-            </a:r>
-            <a:r>
-              <a:rPr lang="en-AU" dirty="0"/>
-              <a:t>'] = </a:t>
-            </a:r>
-            <a:r>
-              <a:rPr lang="en-AU" dirty="0" err="1"/>
-              <a:t>np.where</a:t>
-            </a:r>
-            <a:r>
-              <a:rPr lang="en-AU" dirty="0"/>
-              <a:t>(</a:t>
-            </a:r>
-            <a:r>
-              <a:rPr lang="en-AU" dirty="0" err="1"/>
-              <a:t>model_data</a:t>
-            </a:r>
-            <a:r>
-              <a:rPr lang="en-AU" dirty="0"/>
-              <a:t>['popularity2'] &gt;8, 1, 0)</a:t>
+              <a:t>model_data['popularity_rating'] = np.where(model_data['popularity2'] &gt;8, 1, 0)</a:t>
             </a:r>
           </a:p>
         </p:txBody>

</xml_diff>